<commit_message>
working before updating with SSD1306
</commit_message>
<xml_diff>
--- a/Air_Quality_Meter.pptx
+++ b/Air_Quality_Meter.pptx
@@ -115,7 +115,7 @@
 <file path=ppt/revisionInfo.xml><?xml version="1.0" encoding="utf-8"?>
 <p1510:revInfo xmlns:a="http://schemas.openxmlformats.org/drawingml/2006/main" xmlns:r="http://schemas.openxmlformats.org/officeDocument/2006/relationships" xmlns:p1510="http://schemas.microsoft.com/office/powerpoint/2015/10/main">
   <p1510:revLst>
-    <p1510:client id="{3ECBCCE6-D296-4E23-AFAD-5F822044A1D4}" v="2" dt="2021-11-06T13:41:36.564"/>
+    <p1510:client id="{3ECBCCE6-D296-4E23-AFAD-5F822044A1D4}" v="12" dt="2021-11-07T18:46:20.882"/>
   </p1510:revLst>
 </p1510:revInfo>
 </file>
@@ -517,16 +517,24 @@
   <pc:docChgLst>
     <pc:chgData name="Wilko van de Langenberg" userId="66bda0e3312437e7" providerId="LiveId" clId="{3ECBCCE6-D296-4E23-AFAD-5F822044A1D4}"/>
     <pc:docChg chg="undo custSel modSld">
-      <pc:chgData name="Wilko van de Langenberg" userId="66bda0e3312437e7" providerId="LiveId" clId="{3ECBCCE6-D296-4E23-AFAD-5F822044A1D4}" dt="2021-11-06T13:42:14.091" v="45" actId="6549"/>
+      <pc:chgData name="Wilko van de Langenberg" userId="66bda0e3312437e7" providerId="LiveId" clId="{3ECBCCE6-D296-4E23-AFAD-5F822044A1D4}" dt="2021-11-07T19:38:07.165" v="129" actId="20577"/>
       <pc:docMkLst>
         <pc:docMk/>
       </pc:docMkLst>
       <pc:sldChg chg="addSp delSp modSp mod">
-        <pc:chgData name="Wilko van de Langenberg" userId="66bda0e3312437e7" providerId="LiveId" clId="{3ECBCCE6-D296-4E23-AFAD-5F822044A1D4}" dt="2021-11-06T13:42:14.091" v="45" actId="6549"/>
+        <pc:chgData name="Wilko van de Langenberg" userId="66bda0e3312437e7" providerId="LiveId" clId="{3ECBCCE6-D296-4E23-AFAD-5F822044A1D4}" dt="2021-11-07T19:38:07.165" v="129" actId="20577"/>
         <pc:sldMkLst>
           <pc:docMk/>
           <pc:sldMk cId="25609724" sldId="256"/>
         </pc:sldMkLst>
+        <pc:spChg chg="add mod">
+          <ac:chgData name="Wilko van de Langenberg" userId="66bda0e3312437e7" providerId="LiveId" clId="{3ECBCCE6-D296-4E23-AFAD-5F822044A1D4}" dt="2021-11-07T18:47:04.404" v="124" actId="1076"/>
+          <ac:spMkLst>
+            <pc:docMk/>
+            <pc:sldMk cId="25609724" sldId="256"/>
+            <ac:spMk id="34" creationId="{16203B3E-3FD1-4281-B11B-9C74942CC20F}"/>
+          </ac:spMkLst>
+        </pc:spChg>
         <pc:spChg chg="del">
           <ac:chgData name="Wilko van de Langenberg" userId="66bda0e3312437e7" providerId="LiveId" clId="{3ECBCCE6-D296-4E23-AFAD-5F822044A1D4}" dt="2021-11-06T13:39:51.870" v="5" actId="478"/>
           <ac:spMkLst>
@@ -536,7 +544,7 @@
           </ac:spMkLst>
         </pc:spChg>
         <pc:spChg chg="mod">
-          <ac:chgData name="Wilko van de Langenberg" userId="66bda0e3312437e7" providerId="LiveId" clId="{3ECBCCE6-D296-4E23-AFAD-5F822044A1D4}" dt="2021-11-06T13:42:14.091" v="45" actId="6549"/>
+          <ac:chgData name="Wilko van de Langenberg" userId="66bda0e3312437e7" providerId="LiveId" clId="{3ECBCCE6-D296-4E23-AFAD-5F822044A1D4}" dt="2021-11-07T19:38:07.165" v="129" actId="20577"/>
           <ac:spMkLst>
             <pc:docMk/>
             <pc:sldMk cId="25609724" sldId="256"/>
@@ -544,11 +552,19 @@
           </ac:spMkLst>
         </pc:spChg>
         <pc:picChg chg="add mod ord">
-          <ac:chgData name="Wilko van de Langenberg" userId="66bda0e3312437e7" providerId="LiveId" clId="{3ECBCCE6-D296-4E23-AFAD-5F822044A1D4}" dt="2021-11-06T13:41:43.727" v="22" actId="1076"/>
+          <ac:chgData name="Wilko van de Langenberg" userId="66bda0e3312437e7" providerId="LiveId" clId="{3ECBCCE6-D296-4E23-AFAD-5F822044A1D4}" dt="2021-11-07T18:41:28.391" v="57" actId="1076"/>
           <ac:picMkLst>
             <pc:docMk/>
             <pc:sldMk cId="25609724" sldId="256"/>
             <ac:picMk id="3" creationId="{14ACD1CC-79BE-4D5F-ACA7-EC68F7A3068D}"/>
+          </ac:picMkLst>
+        </pc:picChg>
+        <pc:picChg chg="add del mod">
+          <ac:chgData name="Wilko van de Langenberg" userId="66bda0e3312437e7" providerId="LiveId" clId="{3ECBCCE6-D296-4E23-AFAD-5F822044A1D4}" dt="2021-11-07T18:40:41.126" v="50" actId="478"/>
+          <ac:picMkLst>
+            <pc:docMk/>
+            <pc:sldMk cId="25609724" sldId="256"/>
+            <ac:picMk id="4" creationId="{5BE098C3-9250-4C57-8A33-756923515DD5}"/>
           </ac:picMkLst>
         </pc:picChg>
         <pc:picChg chg="del">
@@ -559,6 +575,14 @@
             <ac:picMk id="9" creationId="{F056058A-8331-4597-8C68-0A600FD6E1A5}"/>
           </ac:picMkLst>
         </pc:picChg>
+        <pc:picChg chg="add mod modCrop">
+          <ac:chgData name="Wilko van de Langenberg" userId="66bda0e3312437e7" providerId="LiveId" clId="{3ECBCCE6-D296-4E23-AFAD-5F822044A1D4}" dt="2021-11-07T18:41:30.244" v="58" actId="1076"/>
+          <ac:picMkLst>
+            <pc:docMk/>
+            <pc:sldMk cId="25609724" sldId="256"/>
+            <ac:picMk id="11" creationId="{FFC01BD3-4C39-4ED3-B44F-20270DB1FEF8}"/>
+          </ac:picMkLst>
+        </pc:picChg>
         <pc:picChg chg="del">
           <ac:chgData name="Wilko van de Langenberg" userId="66bda0e3312437e7" providerId="LiveId" clId="{3ECBCCE6-D296-4E23-AFAD-5F822044A1D4}" dt="2021-11-06T13:39:47.505" v="3" actId="478"/>
           <ac:picMkLst>
@@ -567,8 +591,32 @@
             <ac:picMk id="40" creationId="{7BA6692C-7F7D-4FD9-8B23-122BA2EAC8F0}"/>
           </ac:picMkLst>
         </pc:picChg>
+        <pc:picChg chg="mod">
+          <ac:chgData name="Wilko van de Langenberg" userId="66bda0e3312437e7" providerId="LiveId" clId="{3ECBCCE6-D296-4E23-AFAD-5F822044A1D4}" dt="2021-11-07T18:41:28.391" v="57" actId="1076"/>
+          <ac:picMkLst>
+            <pc:docMk/>
+            <pc:sldMk cId="25609724" sldId="256"/>
+            <ac:picMk id="78" creationId="{40F1E579-1D24-4D55-A7C4-841D2630A142}"/>
+          </ac:picMkLst>
+        </pc:picChg>
         <pc:cxnChg chg="add mod">
-          <ac:chgData name="Wilko van de Langenberg" userId="66bda0e3312437e7" providerId="LiveId" clId="{3ECBCCE6-D296-4E23-AFAD-5F822044A1D4}" dt="2021-11-06T13:41:28.148" v="17" actId="14100"/>
+          <ac:chgData name="Wilko van de Langenberg" userId="66bda0e3312437e7" providerId="LiveId" clId="{3ECBCCE6-D296-4E23-AFAD-5F822044A1D4}" dt="2021-11-07T18:43:35.401" v="61" actId="14100"/>
+          <ac:cxnSpMkLst>
+            <pc:docMk/>
+            <pc:sldMk cId="25609724" sldId="256"/>
+            <ac:cxnSpMk id="12" creationId="{BB76C3B1-0DE9-4937-B4BF-3B7A46C336CC}"/>
+          </ac:cxnSpMkLst>
+        </pc:cxnChg>
+        <pc:cxnChg chg="add mod">
+          <ac:chgData name="Wilko van de Langenberg" userId="66bda0e3312437e7" providerId="LiveId" clId="{3ECBCCE6-D296-4E23-AFAD-5F822044A1D4}" dt="2021-11-07T18:45:46.032" v="82" actId="14100"/>
+          <ac:cxnSpMkLst>
+            <pc:docMk/>
+            <pc:sldMk cId="25609724" sldId="256"/>
+            <ac:cxnSpMk id="15" creationId="{36695E6A-0B6D-4D7D-8906-E9E7519CAAC8}"/>
+          </ac:cxnSpMkLst>
+        </pc:cxnChg>
+        <pc:cxnChg chg="add mod">
+          <ac:chgData name="Wilko van de Langenberg" userId="66bda0e3312437e7" providerId="LiveId" clId="{3ECBCCE6-D296-4E23-AFAD-5F822044A1D4}" dt="2021-11-07T18:41:28.391" v="57" actId="1076"/>
           <ac:cxnSpMkLst>
             <pc:docMk/>
             <pc:sldMk cId="25609724" sldId="256"/>
@@ -576,11 +624,59 @@
           </ac:cxnSpMkLst>
         </pc:cxnChg>
         <pc:cxnChg chg="add mod">
-          <ac:chgData name="Wilko van de Langenberg" userId="66bda0e3312437e7" providerId="LiveId" clId="{3ECBCCE6-D296-4E23-AFAD-5F822044A1D4}" dt="2021-11-06T13:41:53.273" v="24" actId="14100"/>
+          <ac:chgData name="Wilko van de Langenberg" userId="66bda0e3312437e7" providerId="LiveId" clId="{3ECBCCE6-D296-4E23-AFAD-5F822044A1D4}" dt="2021-11-07T18:44:08.032" v="68" actId="208"/>
+          <ac:cxnSpMkLst>
+            <pc:docMk/>
+            <pc:sldMk cId="25609724" sldId="256"/>
+            <ac:cxnSpMk id="19" creationId="{4A5452FE-F917-47A2-8B50-D0D749DD63D2}"/>
+          </ac:cxnSpMkLst>
+        </pc:cxnChg>
+        <pc:cxnChg chg="add mod">
+          <ac:chgData name="Wilko van de Langenberg" userId="66bda0e3312437e7" providerId="LiveId" clId="{3ECBCCE6-D296-4E23-AFAD-5F822044A1D4}" dt="2021-11-07T18:44:21.490" v="72" actId="208"/>
+          <ac:cxnSpMkLst>
+            <pc:docMk/>
+            <pc:sldMk cId="25609724" sldId="256"/>
+            <ac:cxnSpMk id="21" creationId="{725BAFF4-986F-42D5-A4AE-60E6FEA1C50A}"/>
+          </ac:cxnSpMkLst>
+        </pc:cxnChg>
+        <pc:cxnChg chg="add mod">
+          <ac:chgData name="Wilko van de Langenberg" userId="66bda0e3312437e7" providerId="LiveId" clId="{3ECBCCE6-D296-4E23-AFAD-5F822044A1D4}" dt="2021-11-07T18:41:28.391" v="57" actId="1076"/>
           <ac:cxnSpMkLst>
             <pc:docMk/>
             <pc:sldMk cId="25609724" sldId="256"/>
             <ac:cxnSpMk id="23" creationId="{3A0D245A-6D78-4630-A50F-4E4C11F1811C}"/>
+          </ac:cxnSpMkLst>
+        </pc:cxnChg>
+        <pc:cxnChg chg="add mod">
+          <ac:chgData name="Wilko van de Langenberg" userId="66bda0e3312437e7" providerId="LiveId" clId="{3ECBCCE6-D296-4E23-AFAD-5F822044A1D4}" dt="2021-11-07T18:45:11.540" v="76" actId="208"/>
+          <ac:cxnSpMkLst>
+            <pc:docMk/>
+            <pc:sldMk cId="25609724" sldId="256"/>
+            <ac:cxnSpMk id="24" creationId="{BD6F642B-3334-4A14-AAE6-A0DBDCFA83C0}"/>
+          </ac:cxnSpMkLst>
+        </pc:cxnChg>
+        <pc:cxnChg chg="add mod">
+          <ac:chgData name="Wilko van de Langenberg" userId="66bda0e3312437e7" providerId="LiveId" clId="{3ECBCCE6-D296-4E23-AFAD-5F822044A1D4}" dt="2021-11-07T18:45:30.050" v="79" actId="14100"/>
+          <ac:cxnSpMkLst>
+            <pc:docMk/>
+            <pc:sldMk cId="25609724" sldId="256"/>
+            <ac:cxnSpMk id="27" creationId="{8A3705AE-E890-4ECE-8F25-784CF9DB3684}"/>
+          </ac:cxnSpMkLst>
+        </pc:cxnChg>
+        <pc:cxnChg chg="add mod">
+          <ac:chgData name="Wilko van de Langenberg" userId="66bda0e3312437e7" providerId="LiveId" clId="{3ECBCCE6-D296-4E23-AFAD-5F822044A1D4}" dt="2021-11-07T18:45:56.719" v="85" actId="14100"/>
+          <ac:cxnSpMkLst>
+            <pc:docMk/>
+            <pc:sldMk cId="25609724" sldId="256"/>
+            <ac:cxnSpMk id="33" creationId="{96E8C342-1F44-455A-8C17-E7B6E28ED7B2}"/>
+          </ac:cxnSpMkLst>
+        </pc:cxnChg>
+        <pc:cxnChg chg="add del mod">
+          <ac:chgData name="Wilko van de Langenberg" userId="66bda0e3312437e7" providerId="LiveId" clId="{3ECBCCE6-D296-4E23-AFAD-5F822044A1D4}" dt="2021-11-07T19:08:51.403" v="125" actId="478"/>
+          <ac:cxnSpMkLst>
+            <pc:docMk/>
+            <pc:sldMk cId="25609724" sldId="256"/>
+            <ac:cxnSpMk id="36" creationId="{4C708493-C66F-466A-BCA8-BF7C3059C085}"/>
           </ac:cxnSpMkLst>
         </pc:cxnChg>
         <pc:cxnChg chg="del">
@@ -616,7 +712,7 @@
           </ac:cxnSpMkLst>
         </pc:cxnChg>
         <pc:cxnChg chg="mod">
-          <ac:chgData name="Wilko van de Langenberg" userId="66bda0e3312437e7" providerId="LiveId" clId="{3ECBCCE6-D296-4E23-AFAD-5F822044A1D4}" dt="2021-11-06T13:41:31.343" v="18" actId="14100"/>
+          <ac:chgData name="Wilko van de Langenberg" userId="66bda0e3312437e7" providerId="LiveId" clId="{3ECBCCE6-D296-4E23-AFAD-5F822044A1D4}" dt="2021-11-07T18:41:28.391" v="57" actId="1076"/>
           <ac:cxnSpMkLst>
             <pc:docMk/>
             <pc:sldMk cId="25609724" sldId="256"/>
@@ -624,7 +720,7 @@
           </ac:cxnSpMkLst>
         </pc:cxnChg>
         <pc:cxnChg chg="mod">
-          <ac:chgData name="Wilko van de Langenberg" userId="66bda0e3312437e7" providerId="LiveId" clId="{3ECBCCE6-D296-4E23-AFAD-5F822044A1D4}" dt="2021-11-06T13:40:05.710" v="9" actId="14100"/>
+          <ac:chgData name="Wilko van de Langenberg" userId="66bda0e3312437e7" providerId="LiveId" clId="{3ECBCCE6-D296-4E23-AFAD-5F822044A1D4}" dt="2021-11-07T18:45:36.574" v="80" actId="14100"/>
           <ac:cxnSpMkLst>
             <pc:docMk/>
             <pc:sldMk cId="25609724" sldId="256"/>
@@ -1322,7 +1418,7 @@
           <a:p>
             <a:fld id="{B8FD9C47-F5B3-4BCC-A3B0-4D8D677C13F9}" type="datetimeFigureOut">
               <a:rPr lang="en-GB" smtClean="0"/>
-              <a:t>06/11/2021</a:t>
+              <a:t>07/11/2021</a:t>
             </a:fld>
             <a:endParaRPr lang="en-GB"/>
           </a:p>
@@ -1522,7 +1618,7 @@
           <a:p>
             <a:fld id="{B8FD9C47-F5B3-4BCC-A3B0-4D8D677C13F9}" type="datetimeFigureOut">
               <a:rPr lang="en-GB" smtClean="0"/>
-              <a:t>06/11/2021</a:t>
+              <a:t>07/11/2021</a:t>
             </a:fld>
             <a:endParaRPr lang="en-GB"/>
           </a:p>
@@ -1732,7 +1828,7 @@
           <a:p>
             <a:fld id="{B8FD9C47-F5B3-4BCC-A3B0-4D8D677C13F9}" type="datetimeFigureOut">
               <a:rPr lang="en-GB" smtClean="0"/>
-              <a:t>06/11/2021</a:t>
+              <a:t>07/11/2021</a:t>
             </a:fld>
             <a:endParaRPr lang="en-GB"/>
           </a:p>
@@ -1932,7 +2028,7 @@
           <a:p>
             <a:fld id="{B8FD9C47-F5B3-4BCC-A3B0-4D8D677C13F9}" type="datetimeFigureOut">
               <a:rPr lang="en-GB" smtClean="0"/>
-              <a:t>06/11/2021</a:t>
+              <a:t>07/11/2021</a:t>
             </a:fld>
             <a:endParaRPr lang="en-GB"/>
           </a:p>
@@ -2208,7 +2304,7 @@
           <a:p>
             <a:fld id="{B8FD9C47-F5B3-4BCC-A3B0-4D8D677C13F9}" type="datetimeFigureOut">
               <a:rPr lang="en-GB" smtClean="0"/>
-              <a:t>06/11/2021</a:t>
+              <a:t>07/11/2021</a:t>
             </a:fld>
             <a:endParaRPr lang="en-GB"/>
           </a:p>
@@ -2476,7 +2572,7 @@
           <a:p>
             <a:fld id="{B8FD9C47-F5B3-4BCC-A3B0-4D8D677C13F9}" type="datetimeFigureOut">
               <a:rPr lang="en-GB" smtClean="0"/>
-              <a:t>06/11/2021</a:t>
+              <a:t>07/11/2021</a:t>
             </a:fld>
             <a:endParaRPr lang="en-GB"/>
           </a:p>
@@ -2891,7 +2987,7 @@
           <a:p>
             <a:fld id="{B8FD9C47-F5B3-4BCC-A3B0-4D8D677C13F9}" type="datetimeFigureOut">
               <a:rPr lang="en-GB" smtClean="0"/>
-              <a:t>06/11/2021</a:t>
+              <a:t>07/11/2021</a:t>
             </a:fld>
             <a:endParaRPr lang="en-GB"/>
           </a:p>
@@ -3033,7 +3129,7 @@
           <a:p>
             <a:fld id="{B8FD9C47-F5B3-4BCC-A3B0-4D8D677C13F9}" type="datetimeFigureOut">
               <a:rPr lang="en-GB" smtClean="0"/>
-              <a:t>06/11/2021</a:t>
+              <a:t>07/11/2021</a:t>
             </a:fld>
             <a:endParaRPr lang="en-GB"/>
           </a:p>
@@ -3146,7 +3242,7 @@
           <a:p>
             <a:fld id="{B8FD9C47-F5B3-4BCC-A3B0-4D8D677C13F9}" type="datetimeFigureOut">
               <a:rPr lang="en-GB" smtClean="0"/>
-              <a:t>06/11/2021</a:t>
+              <a:t>07/11/2021</a:t>
             </a:fld>
             <a:endParaRPr lang="en-GB"/>
           </a:p>
@@ -3459,7 +3555,7 @@
           <a:p>
             <a:fld id="{B8FD9C47-F5B3-4BCC-A3B0-4D8D677C13F9}" type="datetimeFigureOut">
               <a:rPr lang="en-GB" smtClean="0"/>
-              <a:t>06/11/2021</a:t>
+              <a:t>07/11/2021</a:t>
             </a:fld>
             <a:endParaRPr lang="en-GB"/>
           </a:p>
@@ -3748,7 +3844,7 @@
           <a:p>
             <a:fld id="{B8FD9C47-F5B3-4BCC-A3B0-4D8D677C13F9}" type="datetimeFigureOut">
               <a:rPr lang="en-GB" smtClean="0"/>
-              <a:t>06/11/2021</a:t>
+              <a:t>07/11/2021</a:t>
             </a:fld>
             <a:endParaRPr lang="en-GB"/>
           </a:p>
@@ -3991,7 +4087,7 @@
           <a:p>
             <a:fld id="{B8FD9C47-F5B3-4BCC-A3B0-4D8D677C13F9}" type="datetimeFigureOut">
               <a:rPr lang="en-GB" smtClean="0"/>
-              <a:t>06/11/2021</a:t>
+              <a:t>07/11/2021</a:t>
             </a:fld>
             <a:endParaRPr lang="en-GB"/>
           </a:p>
@@ -4430,7 +4526,7 @@
         </p:blipFill>
         <p:spPr>
           <a:xfrm rot="5400000">
-            <a:off x="7280358" y="1974237"/>
+            <a:off x="4994358" y="907437"/>
             <a:ext cx="2828925" cy="3581400"/>
           </a:xfrm>
           <a:prstGeom prst="rect">
@@ -4459,7 +4555,7 @@
         </p:blipFill>
         <p:spPr>
           <a:xfrm>
-            <a:off x="3386655" y="2120000"/>
+            <a:off x="1100655" y="1053200"/>
             <a:ext cx="2010124" cy="3422547"/>
           </a:xfrm>
           <a:prstGeom prst="rect">
@@ -4483,7 +4579,7 @@
         </p:nvCxnSpPr>
         <p:spPr>
           <a:xfrm flipH="1">
-            <a:off x="5232771" y="3104147"/>
+            <a:off x="2946771" y="2037347"/>
             <a:ext cx="1743310" cy="1082842"/>
           </a:xfrm>
           <a:prstGeom prst="line">
@@ -4526,8 +4622,8 @@
         </p:nvCxnSpPr>
         <p:spPr>
           <a:xfrm flipH="1" flipV="1">
-            <a:off x="5232771" y="2575050"/>
-            <a:ext cx="1801692" cy="408782"/>
+            <a:off x="3790862" y="1529231"/>
+            <a:ext cx="957601" cy="387801"/>
           </a:xfrm>
           <a:prstGeom prst="line">
             <a:avLst/>
@@ -4589,7 +4685,11 @@
           <a:p>
             <a:r>
               <a:rPr lang="en-US" sz="900" dirty="0"/>
-              <a:t>Mutation date 06-11-2021</a:t>
+              <a:t>Mutation </a:t>
+            </a:r>
+            <a:r>
+              <a:rPr lang="en-US" sz="900"/>
+              <a:t>date 07-11-2021</a:t>
             </a:r>
             <a:endParaRPr lang="en-GB" sz="900" dirty="0"/>
           </a:p>
@@ -4611,7 +4711,7 @@
         </p:nvCxnSpPr>
         <p:spPr>
           <a:xfrm flipH="1">
-            <a:off x="5232771" y="3208408"/>
+            <a:off x="2946771" y="2141608"/>
             <a:ext cx="1801692" cy="1139003"/>
           </a:xfrm>
           <a:prstGeom prst="line">
@@ -4654,7 +4754,7 @@
         </p:nvCxnSpPr>
         <p:spPr>
           <a:xfrm flipH="1">
-            <a:off x="3465095" y="2727450"/>
+            <a:off x="1179095" y="1660650"/>
             <a:ext cx="3569368" cy="2750929"/>
           </a:xfrm>
           <a:prstGeom prst="line">
@@ -4681,6 +4781,375 @@
           </a:fontRef>
         </p:style>
       </p:cxnSp>
+      <p:pic>
+        <p:nvPicPr>
+          <p:cNvPr id="11" name="Picture 10">
+            <a:extLst>
+              <a:ext uri="{FF2B5EF4-FFF2-40B4-BE49-F238E27FC236}">
+                <a16:creationId xmlns:a16="http://schemas.microsoft.com/office/drawing/2014/main" id="{FFC01BD3-4C39-4ED3-B44F-20270DB1FEF8}"/>
+              </a:ext>
+            </a:extLst>
+          </p:cNvPr>
+          <p:cNvPicPr/>
+          <p:nvPr/>
+        </p:nvPicPr>
+        <p:blipFill rotWithShape="1">
+          <a:blip r:embed="rId4"/>
+          <a:srcRect r="59373" b="64219"/>
+          <a:stretch/>
+        </p:blipFill>
+        <p:spPr>
+          <a:xfrm>
+            <a:off x="3901969" y="5019029"/>
+            <a:ext cx="1432301" cy="1360379"/>
+          </a:xfrm>
+          <a:prstGeom prst="rect">
+            <a:avLst/>
+          </a:prstGeom>
+        </p:spPr>
+      </p:pic>
+      <p:cxnSp>
+        <p:nvCxnSpPr>
+          <p:cNvPr id="12" name="Straight Connector 11">
+            <a:extLst>
+              <a:ext uri="{FF2B5EF4-FFF2-40B4-BE49-F238E27FC236}">
+                <a16:creationId xmlns:a16="http://schemas.microsoft.com/office/drawing/2014/main" id="{BB76C3B1-0DE9-4937-B4BF-3B7A46C336CC}"/>
+              </a:ext>
+            </a:extLst>
+          </p:cNvPr>
+          <p:cNvCxnSpPr>
+            <a:cxnSpLocks/>
+          </p:cNvCxnSpPr>
+          <p:nvPr/>
+        </p:nvCxnSpPr>
+        <p:spPr>
+          <a:xfrm flipH="1" flipV="1">
+            <a:off x="1179095" y="4398619"/>
+            <a:ext cx="3264568" cy="798732"/>
+          </a:xfrm>
+          <a:prstGeom prst="line">
+            <a:avLst/>
+          </a:prstGeom>
+          <a:ln w="25400">
+            <a:solidFill>
+              <a:srgbClr val="FF0000"/>
+            </a:solidFill>
+          </a:ln>
+        </p:spPr>
+        <p:style>
+          <a:lnRef idx="1">
+            <a:schemeClr val="accent1"/>
+          </a:lnRef>
+          <a:fillRef idx="0">
+            <a:schemeClr val="accent1"/>
+          </a:fillRef>
+          <a:effectRef idx="0">
+            <a:schemeClr val="accent1"/>
+          </a:effectRef>
+          <a:fontRef idx="minor">
+            <a:schemeClr val="tx1"/>
+          </a:fontRef>
+        </p:style>
+      </p:cxnSp>
+      <p:cxnSp>
+        <p:nvCxnSpPr>
+          <p:cNvPr id="15" name="Straight Connector 14">
+            <a:extLst>
+              <a:ext uri="{FF2B5EF4-FFF2-40B4-BE49-F238E27FC236}">
+                <a16:creationId xmlns:a16="http://schemas.microsoft.com/office/drawing/2014/main" id="{36695E6A-0B6D-4D7D-8906-E9E7519CAAC8}"/>
+              </a:ext>
+            </a:extLst>
+          </p:cNvPr>
+          <p:cNvCxnSpPr>
+            <a:cxnSpLocks/>
+          </p:cNvCxnSpPr>
+          <p:nvPr/>
+        </p:nvCxnSpPr>
+        <p:spPr>
+          <a:xfrm flipH="1" flipV="1">
+            <a:off x="3790863" y="1529232"/>
+            <a:ext cx="23034" cy="3799536"/>
+          </a:xfrm>
+          <a:prstGeom prst="line">
+            <a:avLst/>
+          </a:prstGeom>
+          <a:ln w="25400">
+            <a:solidFill>
+              <a:schemeClr val="tx1"/>
+            </a:solidFill>
+          </a:ln>
+        </p:spPr>
+        <p:style>
+          <a:lnRef idx="1">
+            <a:schemeClr val="accent1"/>
+          </a:lnRef>
+          <a:fillRef idx="0">
+            <a:schemeClr val="accent1"/>
+          </a:fillRef>
+          <a:effectRef idx="0">
+            <a:schemeClr val="accent1"/>
+          </a:effectRef>
+          <a:fontRef idx="minor">
+            <a:schemeClr val="tx1"/>
+          </a:fontRef>
+        </p:style>
+      </p:cxnSp>
+      <p:cxnSp>
+        <p:nvCxnSpPr>
+          <p:cNvPr id="19" name="Straight Connector 18">
+            <a:extLst>
+              <a:ext uri="{FF2B5EF4-FFF2-40B4-BE49-F238E27FC236}">
+                <a16:creationId xmlns:a16="http://schemas.microsoft.com/office/drawing/2014/main" id="{4A5452FE-F917-47A2-8B50-D0D749DD63D2}"/>
+              </a:ext>
+            </a:extLst>
+          </p:cNvPr>
+          <p:cNvCxnSpPr>
+            <a:cxnSpLocks/>
+          </p:cNvCxnSpPr>
+          <p:nvPr/>
+        </p:nvCxnSpPr>
+        <p:spPr>
+          <a:xfrm flipH="1" flipV="1">
+            <a:off x="2973349" y="2764473"/>
+            <a:ext cx="1733566" cy="2432878"/>
+          </a:xfrm>
+          <a:prstGeom prst="line">
+            <a:avLst/>
+          </a:prstGeom>
+          <a:ln w="25400">
+            <a:solidFill>
+              <a:srgbClr val="FFFF00"/>
+            </a:solidFill>
+          </a:ln>
+        </p:spPr>
+        <p:style>
+          <a:lnRef idx="1">
+            <a:schemeClr val="accent1"/>
+          </a:lnRef>
+          <a:fillRef idx="0">
+            <a:schemeClr val="accent1"/>
+          </a:fillRef>
+          <a:effectRef idx="0">
+            <a:schemeClr val="accent1"/>
+          </a:effectRef>
+          <a:fontRef idx="minor">
+            <a:schemeClr val="tx1"/>
+          </a:fontRef>
+        </p:style>
+      </p:cxnSp>
+      <p:cxnSp>
+        <p:nvCxnSpPr>
+          <p:cNvPr id="21" name="Straight Connector 20">
+            <a:extLst>
+              <a:ext uri="{FF2B5EF4-FFF2-40B4-BE49-F238E27FC236}">
+                <a16:creationId xmlns:a16="http://schemas.microsoft.com/office/drawing/2014/main" id="{725BAFF4-986F-42D5-A4AE-60E6FEA1C50A}"/>
+              </a:ext>
+            </a:extLst>
+          </p:cNvPr>
+          <p:cNvCxnSpPr>
+            <a:cxnSpLocks/>
+          </p:cNvCxnSpPr>
+          <p:nvPr/>
+        </p:nvCxnSpPr>
+        <p:spPr>
+          <a:xfrm flipH="1" flipV="1">
+            <a:off x="3012327" y="2643250"/>
+            <a:ext cx="1866128" cy="2575629"/>
+          </a:xfrm>
+          <a:prstGeom prst="line">
+            <a:avLst/>
+          </a:prstGeom>
+          <a:ln w="25400">
+            <a:solidFill>
+              <a:srgbClr val="FFC000"/>
+            </a:solidFill>
+          </a:ln>
+        </p:spPr>
+        <p:style>
+          <a:lnRef idx="1">
+            <a:schemeClr val="accent1"/>
+          </a:lnRef>
+          <a:fillRef idx="0">
+            <a:schemeClr val="accent1"/>
+          </a:fillRef>
+          <a:effectRef idx="0">
+            <a:schemeClr val="accent1"/>
+          </a:effectRef>
+          <a:fontRef idx="minor">
+            <a:schemeClr val="tx1"/>
+          </a:fontRef>
+        </p:style>
+      </p:cxnSp>
+      <p:cxnSp>
+        <p:nvCxnSpPr>
+          <p:cNvPr id="24" name="Straight Connector 23">
+            <a:extLst>
+              <a:ext uri="{FF2B5EF4-FFF2-40B4-BE49-F238E27FC236}">
+                <a16:creationId xmlns:a16="http://schemas.microsoft.com/office/drawing/2014/main" id="{BD6F642B-3334-4A14-AAE6-A0DBDCFA83C0}"/>
+              </a:ext>
+            </a:extLst>
+          </p:cNvPr>
+          <p:cNvCxnSpPr>
+            <a:cxnSpLocks/>
+          </p:cNvCxnSpPr>
+          <p:nvPr/>
+        </p:nvCxnSpPr>
+        <p:spPr>
+          <a:xfrm flipV="1">
+            <a:off x="770021" y="3120190"/>
+            <a:ext cx="409074" cy="2600331"/>
+          </a:xfrm>
+          <a:prstGeom prst="line">
+            <a:avLst/>
+          </a:prstGeom>
+          <a:ln w="25400">
+            <a:solidFill>
+              <a:srgbClr val="00B0F0"/>
+            </a:solidFill>
+          </a:ln>
+        </p:spPr>
+        <p:style>
+          <a:lnRef idx="1">
+            <a:schemeClr val="accent1"/>
+          </a:lnRef>
+          <a:fillRef idx="0">
+            <a:schemeClr val="accent1"/>
+          </a:fillRef>
+          <a:effectRef idx="0">
+            <a:schemeClr val="accent1"/>
+          </a:effectRef>
+          <a:fontRef idx="minor">
+            <a:schemeClr val="tx1"/>
+          </a:fontRef>
+        </p:style>
+      </p:cxnSp>
+      <p:cxnSp>
+        <p:nvCxnSpPr>
+          <p:cNvPr id="27" name="Straight Connector 26">
+            <a:extLst>
+              <a:ext uri="{FF2B5EF4-FFF2-40B4-BE49-F238E27FC236}">
+                <a16:creationId xmlns:a16="http://schemas.microsoft.com/office/drawing/2014/main" id="{8A3705AE-E890-4ECE-8F25-784CF9DB3684}"/>
+              </a:ext>
+            </a:extLst>
+          </p:cNvPr>
+          <p:cNvCxnSpPr>
+            <a:cxnSpLocks/>
+          </p:cNvCxnSpPr>
+          <p:nvPr/>
+        </p:nvCxnSpPr>
+        <p:spPr>
+          <a:xfrm flipH="1" flipV="1">
+            <a:off x="2973349" y="1529232"/>
+            <a:ext cx="840548" cy="4926"/>
+          </a:xfrm>
+          <a:prstGeom prst="line">
+            <a:avLst/>
+          </a:prstGeom>
+          <a:ln w="25400">
+            <a:solidFill>
+              <a:schemeClr val="tx1"/>
+            </a:solidFill>
+          </a:ln>
+        </p:spPr>
+        <p:style>
+          <a:lnRef idx="1">
+            <a:schemeClr val="accent1"/>
+          </a:lnRef>
+          <a:fillRef idx="0">
+            <a:schemeClr val="accent1"/>
+          </a:fillRef>
+          <a:effectRef idx="0">
+            <a:schemeClr val="accent1"/>
+          </a:effectRef>
+          <a:fontRef idx="minor">
+            <a:schemeClr val="tx1"/>
+          </a:fontRef>
+        </p:style>
+      </p:cxnSp>
+      <p:cxnSp>
+        <p:nvCxnSpPr>
+          <p:cNvPr id="33" name="Straight Connector 32">
+            <a:extLst>
+              <a:ext uri="{FF2B5EF4-FFF2-40B4-BE49-F238E27FC236}">
+                <a16:creationId xmlns:a16="http://schemas.microsoft.com/office/drawing/2014/main" id="{96E8C342-1F44-455A-8C17-E7B6E28ED7B2}"/>
+              </a:ext>
+            </a:extLst>
+          </p:cNvPr>
+          <p:cNvCxnSpPr>
+            <a:cxnSpLocks/>
+          </p:cNvCxnSpPr>
+          <p:nvPr/>
+        </p:nvCxnSpPr>
+        <p:spPr>
+          <a:xfrm flipH="1">
+            <a:off x="3813897" y="5197350"/>
+            <a:ext cx="740618" cy="99335"/>
+          </a:xfrm>
+          <a:prstGeom prst="line">
+            <a:avLst/>
+          </a:prstGeom>
+          <a:ln w="25400">
+            <a:solidFill>
+              <a:schemeClr val="tx1"/>
+            </a:solidFill>
+          </a:ln>
+        </p:spPr>
+        <p:style>
+          <a:lnRef idx="1">
+            <a:schemeClr val="accent1"/>
+          </a:lnRef>
+          <a:fillRef idx="0">
+            <a:schemeClr val="accent1"/>
+          </a:fillRef>
+          <a:effectRef idx="0">
+            <a:schemeClr val="accent1"/>
+          </a:effectRef>
+          <a:fontRef idx="minor">
+            <a:schemeClr val="tx1"/>
+          </a:fontRef>
+        </p:style>
+      </p:cxnSp>
+      <p:sp>
+        <p:nvSpPr>
+          <p:cNvPr id="34" name="TextBox 33">
+            <a:extLst>
+              <a:ext uri="{FF2B5EF4-FFF2-40B4-BE49-F238E27FC236}">
+                <a16:creationId xmlns:a16="http://schemas.microsoft.com/office/drawing/2014/main" id="{16203B3E-3FD1-4281-B11B-9C74942CC20F}"/>
+              </a:ext>
+            </a:extLst>
+          </p:cNvPr>
+          <p:cNvSpPr txBox="1"/>
+          <p:nvPr/>
+        </p:nvSpPr>
+        <p:spPr>
+          <a:xfrm>
+            <a:off x="169673" y="5720521"/>
+            <a:ext cx="1609770" cy="261610"/>
+          </a:xfrm>
+          <a:prstGeom prst="rect">
+            <a:avLst/>
+          </a:prstGeom>
+          <a:noFill/>
+          <a:ln>
+            <a:solidFill>
+              <a:schemeClr val="tx1"/>
+            </a:solidFill>
+          </a:ln>
+        </p:spPr>
+        <p:txBody>
+          <a:bodyPr wrap="square" rtlCol="0">
+            <a:spAutoFit/>
+          </a:bodyPr>
+          <a:lstStyle/>
+          <a:p>
+            <a:r>
+              <a:rPr lang="en-US" sz="1100" dirty="0"/>
+              <a:t>Cable as capacitive touch</a:t>
+            </a:r>
+            <a:endParaRPr lang="en-GB" sz="1100" dirty="0"/>
+          </a:p>
+        </p:txBody>
+      </p:sp>
     </p:spTree>
     <p:extLst>
       <p:ext uri="{BB962C8B-B14F-4D97-AF65-F5344CB8AC3E}">

</xml_diff>

<commit_message>
Added 3D printer files and updated code DHT11
</commit_message>
<xml_diff>
--- a/Air_Quality_Meter.pptx
+++ b/Air_Quality_Meter.pptx
@@ -115,7 +115,7 @@
 <file path=ppt/revisionInfo.xml><?xml version="1.0" encoding="utf-8"?>
 <p1510:revInfo xmlns:a="http://schemas.openxmlformats.org/drawingml/2006/main" xmlns:r="http://schemas.openxmlformats.org/officeDocument/2006/relationships" xmlns:p1510="http://schemas.microsoft.com/office/powerpoint/2015/10/main">
   <p1510:revLst>
-    <p1510:client id="{3ECBCCE6-D296-4E23-AFAD-5F822044A1D4}" v="12" dt="2021-11-07T18:46:20.882"/>
+    <p1510:client id="{3ECBCCE6-D296-4E23-AFAD-5F822044A1D4}" v="19" dt="2021-11-08T18:58:19.772"/>
   </p1510:revLst>
 </p1510:revInfo>
 </file>
@@ -517,12 +517,12 @@
   <pc:docChgLst>
     <pc:chgData name="Wilko van de Langenberg" userId="66bda0e3312437e7" providerId="LiveId" clId="{3ECBCCE6-D296-4E23-AFAD-5F822044A1D4}"/>
     <pc:docChg chg="undo custSel modSld">
-      <pc:chgData name="Wilko van de Langenberg" userId="66bda0e3312437e7" providerId="LiveId" clId="{3ECBCCE6-D296-4E23-AFAD-5F822044A1D4}" dt="2021-11-07T19:38:07.165" v="129" actId="20577"/>
+      <pc:chgData name="Wilko van de Langenberg" userId="66bda0e3312437e7" providerId="LiveId" clId="{3ECBCCE6-D296-4E23-AFAD-5F822044A1D4}" dt="2021-11-08T18:58:43.612" v="169" actId="1076"/>
       <pc:docMkLst>
         <pc:docMk/>
       </pc:docMkLst>
       <pc:sldChg chg="addSp delSp modSp mod">
-        <pc:chgData name="Wilko van de Langenberg" userId="66bda0e3312437e7" providerId="LiveId" clId="{3ECBCCE6-D296-4E23-AFAD-5F822044A1D4}" dt="2021-11-07T19:38:07.165" v="129" actId="20577"/>
+        <pc:chgData name="Wilko van de Langenberg" userId="66bda0e3312437e7" providerId="LiveId" clId="{3ECBCCE6-D296-4E23-AFAD-5F822044A1D4}" dt="2021-11-08T18:58:43.612" v="169" actId="1076"/>
         <pc:sldMkLst>
           <pc:docMk/>
           <pc:sldMk cId="25609724" sldId="256"/>
@@ -535,6 +535,14 @@
             <ac:spMk id="34" creationId="{16203B3E-3FD1-4281-B11B-9C74942CC20F}"/>
           </ac:spMkLst>
         </pc:spChg>
+        <pc:spChg chg="add mod">
+          <ac:chgData name="Wilko van de Langenberg" userId="66bda0e3312437e7" providerId="LiveId" clId="{3ECBCCE6-D296-4E23-AFAD-5F822044A1D4}" dt="2021-11-08T18:58:31.126" v="166" actId="1076"/>
+          <ac:spMkLst>
+            <pc:docMk/>
+            <pc:sldMk cId="25609724" sldId="256"/>
+            <ac:spMk id="40" creationId="{D0C6A65A-7034-4F8C-9A6F-DC2A9F91E72C}"/>
+          </ac:spMkLst>
+        </pc:spChg>
         <pc:spChg chg="del">
           <ac:chgData name="Wilko van de Langenberg" userId="66bda0e3312437e7" providerId="LiveId" clId="{3ECBCCE6-D296-4E23-AFAD-5F822044A1D4}" dt="2021-11-06T13:39:51.870" v="5" actId="478"/>
           <ac:spMkLst>
@@ -544,7 +552,7 @@
           </ac:spMkLst>
         </pc:spChg>
         <pc:spChg chg="mod">
-          <ac:chgData name="Wilko van de Langenberg" userId="66bda0e3312437e7" providerId="LiveId" clId="{3ECBCCE6-D296-4E23-AFAD-5F822044A1D4}" dt="2021-11-07T19:38:07.165" v="129" actId="20577"/>
+          <ac:chgData name="Wilko van de Langenberg" userId="66bda0e3312437e7" providerId="LiveId" clId="{3ECBCCE6-D296-4E23-AFAD-5F822044A1D4}" dt="2021-11-08T18:58:43.612" v="169" actId="1076"/>
           <ac:spMkLst>
             <pc:docMk/>
             <pc:sldMk cId="25609724" sldId="256"/>
@@ -583,6 +591,22 @@
             <ac:picMk id="11" creationId="{FFC01BD3-4C39-4ED3-B44F-20270DB1FEF8}"/>
           </ac:picMkLst>
         </pc:picChg>
+        <pc:picChg chg="add mod">
+          <ac:chgData name="Wilko van de Langenberg" userId="66bda0e3312437e7" providerId="LiveId" clId="{3ECBCCE6-D296-4E23-AFAD-5F822044A1D4}" dt="2021-11-08T18:55:29.486" v="135" actId="1076"/>
+          <ac:picMkLst>
+            <pc:docMk/>
+            <pc:sldMk cId="25609724" sldId="256"/>
+            <ac:picMk id="20" creationId="{D6EE5CF9-59FE-4DEC-B28D-96265D5DB28D}"/>
+          </ac:picMkLst>
+        </pc:picChg>
+        <pc:picChg chg="add mod">
+          <ac:chgData name="Wilko van de Langenberg" userId="66bda0e3312437e7" providerId="LiveId" clId="{3ECBCCE6-D296-4E23-AFAD-5F822044A1D4}" dt="2021-11-08T18:57:59.580" v="154" actId="1076"/>
+          <ac:picMkLst>
+            <pc:docMk/>
+            <pc:sldMk cId="25609724" sldId="256"/>
+            <ac:picMk id="28" creationId="{EFE17093-B5ED-4B9E-8927-2D9461978B5E}"/>
+          </ac:picMkLst>
+        </pc:picChg>
         <pc:picChg chg="del">
           <ac:chgData name="Wilko van de Langenberg" userId="66bda0e3312437e7" providerId="LiveId" clId="{3ECBCCE6-D296-4E23-AFAD-5F822044A1D4}" dt="2021-11-06T13:39:47.505" v="3" actId="478"/>
           <ac:picMkLst>
@@ -640,7 +664,15 @@
           </ac:cxnSpMkLst>
         </pc:cxnChg>
         <pc:cxnChg chg="add mod">
-          <ac:chgData name="Wilko van de Langenberg" userId="66bda0e3312437e7" providerId="LiveId" clId="{3ECBCCE6-D296-4E23-AFAD-5F822044A1D4}" dt="2021-11-07T18:41:28.391" v="57" actId="1076"/>
+          <ac:chgData name="Wilko van de Langenberg" userId="66bda0e3312437e7" providerId="LiveId" clId="{3ECBCCE6-D296-4E23-AFAD-5F822044A1D4}" dt="2021-11-08T18:56:41.103" v="151" actId="14100"/>
+          <ac:cxnSpMkLst>
+            <pc:docMk/>
+            <pc:sldMk cId="25609724" sldId="256"/>
+            <ac:cxnSpMk id="22" creationId="{B3BD722B-9F92-4DE9-BFE8-2BE4141D3690}"/>
+          </ac:cxnSpMkLst>
+        </pc:cxnChg>
+        <pc:cxnChg chg="add mod">
+          <ac:chgData name="Wilko van de Langenberg" userId="66bda0e3312437e7" providerId="LiveId" clId="{3ECBCCE6-D296-4E23-AFAD-5F822044A1D4}" dt="2021-11-08T18:55:53.209" v="139" actId="14100"/>
           <ac:cxnSpMkLst>
             <pc:docMk/>
             <pc:sldMk cId="25609724" sldId="256"/>
@@ -656,11 +688,35 @@
           </ac:cxnSpMkLst>
         </pc:cxnChg>
         <pc:cxnChg chg="add mod">
+          <ac:chgData name="Wilko van de Langenberg" userId="66bda0e3312437e7" providerId="LiveId" clId="{3ECBCCE6-D296-4E23-AFAD-5F822044A1D4}" dt="2021-11-08T18:56:01.227" v="142" actId="14100"/>
+          <ac:cxnSpMkLst>
+            <pc:docMk/>
+            <pc:sldMk cId="25609724" sldId="256"/>
+            <ac:cxnSpMk id="25" creationId="{29445704-814F-4D2C-8BFA-DB2322B5B33F}"/>
+          </ac:cxnSpMkLst>
+        </pc:cxnChg>
+        <pc:cxnChg chg="add mod">
+          <ac:chgData name="Wilko van de Langenberg" userId="66bda0e3312437e7" providerId="LiveId" clId="{3ECBCCE6-D296-4E23-AFAD-5F822044A1D4}" dt="2021-11-08T18:56:10.009" v="145" actId="14100"/>
+          <ac:cxnSpMkLst>
+            <pc:docMk/>
+            <pc:sldMk cId="25609724" sldId="256"/>
+            <ac:cxnSpMk id="26" creationId="{EBF196B7-20DC-45C5-87AF-03E417B62C1E}"/>
+          </ac:cxnSpMkLst>
+        </pc:cxnChg>
+        <pc:cxnChg chg="add mod">
           <ac:chgData name="Wilko van de Langenberg" userId="66bda0e3312437e7" providerId="LiveId" clId="{3ECBCCE6-D296-4E23-AFAD-5F822044A1D4}" dt="2021-11-07T18:45:30.050" v="79" actId="14100"/>
           <ac:cxnSpMkLst>
             <pc:docMk/>
             <pc:sldMk cId="25609724" sldId="256"/>
             <ac:cxnSpMk id="27" creationId="{8A3705AE-E890-4ECE-8F25-784CF9DB3684}"/>
+          </ac:cxnSpMkLst>
+        </pc:cxnChg>
+        <pc:cxnChg chg="add mod">
+          <ac:chgData name="Wilko van de Langenberg" userId="66bda0e3312437e7" providerId="LiveId" clId="{3ECBCCE6-D296-4E23-AFAD-5F822044A1D4}" dt="2021-11-08T18:58:08.468" v="157" actId="14100"/>
+          <ac:cxnSpMkLst>
+            <pc:docMk/>
+            <pc:sldMk cId="25609724" sldId="256"/>
+            <ac:cxnSpMk id="29" creationId="{F3B1E086-B9DB-4257-A705-90251F28E385}"/>
           </ac:cxnSpMkLst>
         </pc:cxnChg>
         <pc:cxnChg chg="add mod">
@@ -669,6 +725,14 @@
             <pc:docMk/>
             <pc:sldMk cId="25609724" sldId="256"/>
             <ac:cxnSpMk id="33" creationId="{96E8C342-1F44-455A-8C17-E7B6E28ED7B2}"/>
+          </ac:cxnSpMkLst>
+        </pc:cxnChg>
+        <pc:cxnChg chg="add mod">
+          <ac:chgData name="Wilko van de Langenberg" userId="66bda0e3312437e7" providerId="LiveId" clId="{3ECBCCE6-D296-4E23-AFAD-5F822044A1D4}" dt="2021-11-08T18:58:13.387" v="158" actId="14100"/>
+          <ac:cxnSpMkLst>
+            <pc:docMk/>
+            <pc:sldMk cId="25609724" sldId="256"/>
+            <ac:cxnSpMk id="36" creationId="{0A5066A6-7A74-4DC2-B3AC-28C8813BE09C}"/>
           </ac:cxnSpMkLst>
         </pc:cxnChg>
         <pc:cxnChg chg="add del mod">
@@ -1418,7 +1482,7 @@
           <a:p>
             <a:fld id="{B8FD9C47-F5B3-4BCC-A3B0-4D8D677C13F9}" type="datetimeFigureOut">
               <a:rPr lang="en-GB" smtClean="0"/>
-              <a:t>07/11/2021</a:t>
+              <a:t>08/11/2021</a:t>
             </a:fld>
             <a:endParaRPr lang="en-GB"/>
           </a:p>
@@ -1618,7 +1682,7 @@
           <a:p>
             <a:fld id="{B8FD9C47-F5B3-4BCC-A3B0-4D8D677C13F9}" type="datetimeFigureOut">
               <a:rPr lang="en-GB" smtClean="0"/>
-              <a:t>07/11/2021</a:t>
+              <a:t>08/11/2021</a:t>
             </a:fld>
             <a:endParaRPr lang="en-GB"/>
           </a:p>
@@ -1828,7 +1892,7 @@
           <a:p>
             <a:fld id="{B8FD9C47-F5B3-4BCC-A3B0-4D8D677C13F9}" type="datetimeFigureOut">
               <a:rPr lang="en-GB" smtClean="0"/>
-              <a:t>07/11/2021</a:t>
+              <a:t>08/11/2021</a:t>
             </a:fld>
             <a:endParaRPr lang="en-GB"/>
           </a:p>
@@ -2028,7 +2092,7 @@
           <a:p>
             <a:fld id="{B8FD9C47-F5B3-4BCC-A3B0-4D8D677C13F9}" type="datetimeFigureOut">
               <a:rPr lang="en-GB" smtClean="0"/>
-              <a:t>07/11/2021</a:t>
+              <a:t>08/11/2021</a:t>
             </a:fld>
             <a:endParaRPr lang="en-GB"/>
           </a:p>
@@ -2304,7 +2368,7 @@
           <a:p>
             <a:fld id="{B8FD9C47-F5B3-4BCC-A3B0-4D8D677C13F9}" type="datetimeFigureOut">
               <a:rPr lang="en-GB" smtClean="0"/>
-              <a:t>07/11/2021</a:t>
+              <a:t>08/11/2021</a:t>
             </a:fld>
             <a:endParaRPr lang="en-GB"/>
           </a:p>
@@ -2572,7 +2636,7 @@
           <a:p>
             <a:fld id="{B8FD9C47-F5B3-4BCC-A3B0-4D8D677C13F9}" type="datetimeFigureOut">
               <a:rPr lang="en-GB" smtClean="0"/>
-              <a:t>07/11/2021</a:t>
+              <a:t>08/11/2021</a:t>
             </a:fld>
             <a:endParaRPr lang="en-GB"/>
           </a:p>
@@ -2987,7 +3051,7 @@
           <a:p>
             <a:fld id="{B8FD9C47-F5B3-4BCC-A3B0-4D8D677C13F9}" type="datetimeFigureOut">
               <a:rPr lang="en-GB" smtClean="0"/>
-              <a:t>07/11/2021</a:t>
+              <a:t>08/11/2021</a:t>
             </a:fld>
             <a:endParaRPr lang="en-GB"/>
           </a:p>
@@ -3129,7 +3193,7 @@
           <a:p>
             <a:fld id="{B8FD9C47-F5B3-4BCC-A3B0-4D8D677C13F9}" type="datetimeFigureOut">
               <a:rPr lang="en-GB" smtClean="0"/>
-              <a:t>07/11/2021</a:t>
+              <a:t>08/11/2021</a:t>
             </a:fld>
             <a:endParaRPr lang="en-GB"/>
           </a:p>
@@ -3242,7 +3306,7 @@
           <a:p>
             <a:fld id="{B8FD9C47-F5B3-4BCC-A3B0-4D8D677C13F9}" type="datetimeFigureOut">
               <a:rPr lang="en-GB" smtClean="0"/>
-              <a:t>07/11/2021</a:t>
+              <a:t>08/11/2021</a:t>
             </a:fld>
             <a:endParaRPr lang="en-GB"/>
           </a:p>
@@ -3555,7 +3619,7 @@
           <a:p>
             <a:fld id="{B8FD9C47-F5B3-4BCC-A3B0-4D8D677C13F9}" type="datetimeFigureOut">
               <a:rPr lang="en-GB" smtClean="0"/>
-              <a:t>07/11/2021</a:t>
+              <a:t>08/11/2021</a:t>
             </a:fld>
             <a:endParaRPr lang="en-GB"/>
           </a:p>
@@ -3844,7 +3908,7 @@
           <a:p>
             <a:fld id="{B8FD9C47-F5B3-4BCC-A3B0-4D8D677C13F9}" type="datetimeFigureOut">
               <a:rPr lang="en-GB" smtClean="0"/>
-              <a:t>07/11/2021</a:t>
+              <a:t>08/11/2021</a:t>
             </a:fld>
             <a:endParaRPr lang="en-GB"/>
           </a:p>
@@ -4087,7 +4151,7 @@
           <a:p>
             <a:fld id="{B8FD9C47-F5B3-4BCC-A3B0-4D8D677C13F9}" type="datetimeFigureOut">
               <a:rPr lang="en-GB" smtClean="0"/>
-              <a:t>07/11/2021</a:t>
+              <a:t>08/11/2021</a:t>
             </a:fld>
             <a:endParaRPr lang="en-GB"/>
           </a:p>
@@ -4663,7 +4727,7 @@
         </p:nvSpPr>
         <p:spPr>
           <a:xfrm>
-            <a:off x="6604235" y="185839"/>
+            <a:off x="9128360" y="149054"/>
             <a:ext cx="2894739" cy="369332"/>
           </a:xfrm>
           <a:prstGeom prst="rect">
@@ -4685,11 +4749,7 @@
           <a:p>
             <a:r>
               <a:rPr lang="en-US" sz="900" dirty="0"/>
-              <a:t>Mutation </a:t>
-            </a:r>
-            <a:r>
-              <a:rPr lang="en-US" sz="900"/>
-              <a:t>date 07-11-2021</a:t>
+              <a:t>Mutation date 08-11-2021</a:t>
             </a:r>
             <a:endParaRPr lang="en-GB" sz="900" dirty="0"/>
           </a:p>
@@ -4754,8 +4814,8 @@
         </p:nvCxnSpPr>
         <p:spPr>
           <a:xfrm flipH="1">
-            <a:off x="1179095" y="1660650"/>
-            <a:ext cx="3569368" cy="2750929"/>
+            <a:off x="1179095" y="2141608"/>
+            <a:ext cx="2261246" cy="2269971"/>
           </a:xfrm>
           <a:prstGeom prst="line">
             <a:avLst/>
@@ -5147,6 +5207,321 @@
               <a:t>Cable as capacitive touch</a:t>
             </a:r>
             <a:endParaRPr lang="en-GB" sz="1100" dirty="0"/>
+          </a:p>
+        </p:txBody>
+      </p:sp>
+      <p:pic>
+        <p:nvPicPr>
+          <p:cNvPr id="20" name="Picture 19">
+            <a:extLst>
+              <a:ext uri="{FF2B5EF4-FFF2-40B4-BE49-F238E27FC236}">
+                <a16:creationId xmlns:a16="http://schemas.microsoft.com/office/drawing/2014/main" id="{D6EE5CF9-59FE-4DEC-B28D-96265D5DB28D}"/>
+              </a:ext>
+            </a:extLst>
+          </p:cNvPr>
+          <p:cNvPicPr/>
+          <p:nvPr/>
+        </p:nvPicPr>
+        <p:blipFill>
+          <a:blip r:embed="rId5"/>
+          <a:stretch>
+            <a:fillRect/>
+          </a:stretch>
+        </p:blipFill>
+        <p:spPr>
+          <a:xfrm rot="5400000">
+            <a:off x="3788493" y="-711774"/>
+            <a:ext cx="1179195" cy="2419350"/>
+          </a:xfrm>
+          <a:prstGeom prst="rect">
+            <a:avLst/>
+          </a:prstGeom>
+        </p:spPr>
+      </p:pic>
+      <p:cxnSp>
+        <p:nvCxnSpPr>
+          <p:cNvPr id="22" name="Straight Connector 21">
+            <a:extLst>
+              <a:ext uri="{FF2B5EF4-FFF2-40B4-BE49-F238E27FC236}">
+                <a16:creationId xmlns:a16="http://schemas.microsoft.com/office/drawing/2014/main" id="{B3BD722B-9F92-4DE9-BFE8-2BE4141D3690}"/>
+              </a:ext>
+            </a:extLst>
+          </p:cNvPr>
+          <p:cNvCxnSpPr>
+            <a:cxnSpLocks/>
+          </p:cNvCxnSpPr>
+          <p:nvPr/>
+        </p:nvCxnSpPr>
+        <p:spPr>
+          <a:xfrm flipH="1">
+            <a:off x="3440341" y="248497"/>
+            <a:ext cx="474661" cy="1893111"/>
+          </a:xfrm>
+          <a:prstGeom prst="line">
+            <a:avLst/>
+          </a:prstGeom>
+          <a:ln w="25400">
+            <a:solidFill>
+              <a:srgbClr val="FF0000"/>
+            </a:solidFill>
+          </a:ln>
+        </p:spPr>
+        <p:style>
+          <a:lnRef idx="1">
+            <a:schemeClr val="accent1"/>
+          </a:lnRef>
+          <a:fillRef idx="0">
+            <a:schemeClr val="accent1"/>
+          </a:fillRef>
+          <a:effectRef idx="0">
+            <a:schemeClr val="accent1"/>
+          </a:effectRef>
+          <a:fontRef idx="minor">
+            <a:schemeClr val="tx1"/>
+          </a:fontRef>
+        </p:style>
+      </p:cxnSp>
+      <p:cxnSp>
+        <p:nvCxnSpPr>
+          <p:cNvPr id="25" name="Straight Connector 24">
+            <a:extLst>
+              <a:ext uri="{FF2B5EF4-FFF2-40B4-BE49-F238E27FC236}">
+                <a16:creationId xmlns:a16="http://schemas.microsoft.com/office/drawing/2014/main" id="{29445704-814F-4D2C-8BFA-DB2322B5B33F}"/>
+              </a:ext>
+            </a:extLst>
+          </p:cNvPr>
+          <p:cNvCxnSpPr>
+            <a:cxnSpLocks/>
+          </p:cNvCxnSpPr>
+          <p:nvPr/>
+        </p:nvCxnSpPr>
+        <p:spPr>
+          <a:xfrm flipH="1">
+            <a:off x="3440340" y="1706160"/>
+            <a:ext cx="1287167" cy="407047"/>
+          </a:xfrm>
+          <a:prstGeom prst="line">
+            <a:avLst/>
+          </a:prstGeom>
+          <a:ln w="25400">
+            <a:solidFill>
+              <a:srgbClr val="FF0000"/>
+            </a:solidFill>
+          </a:ln>
+        </p:spPr>
+        <p:style>
+          <a:lnRef idx="1">
+            <a:schemeClr val="accent1"/>
+          </a:lnRef>
+          <a:fillRef idx="0">
+            <a:schemeClr val="accent1"/>
+          </a:fillRef>
+          <a:effectRef idx="0">
+            <a:schemeClr val="accent1"/>
+          </a:effectRef>
+          <a:fontRef idx="minor">
+            <a:schemeClr val="tx1"/>
+          </a:fontRef>
+        </p:style>
+      </p:cxnSp>
+      <p:cxnSp>
+        <p:nvCxnSpPr>
+          <p:cNvPr id="26" name="Straight Connector 25">
+            <a:extLst>
+              <a:ext uri="{FF2B5EF4-FFF2-40B4-BE49-F238E27FC236}">
+                <a16:creationId xmlns:a16="http://schemas.microsoft.com/office/drawing/2014/main" id="{EBF196B7-20DC-45C5-87AF-03E417B62C1E}"/>
+              </a:ext>
+            </a:extLst>
+          </p:cNvPr>
+          <p:cNvCxnSpPr>
+            <a:cxnSpLocks/>
+          </p:cNvCxnSpPr>
+          <p:nvPr/>
+        </p:nvCxnSpPr>
+        <p:spPr>
+          <a:xfrm flipH="1">
+            <a:off x="3813898" y="760504"/>
+            <a:ext cx="142787" cy="785235"/>
+          </a:xfrm>
+          <a:prstGeom prst="line">
+            <a:avLst/>
+          </a:prstGeom>
+          <a:ln w="25400">
+            <a:solidFill>
+              <a:schemeClr val="tx1"/>
+            </a:solidFill>
+          </a:ln>
+        </p:spPr>
+        <p:style>
+          <a:lnRef idx="1">
+            <a:schemeClr val="accent1"/>
+          </a:lnRef>
+          <a:fillRef idx="0">
+            <a:schemeClr val="accent1"/>
+          </a:fillRef>
+          <a:effectRef idx="0">
+            <a:schemeClr val="accent1"/>
+          </a:effectRef>
+          <a:fontRef idx="minor">
+            <a:schemeClr val="tx1"/>
+          </a:fontRef>
+        </p:style>
+      </p:cxnSp>
+      <p:cxnSp>
+        <p:nvCxnSpPr>
+          <p:cNvPr id="29" name="Straight Connector 28">
+            <a:extLst>
+              <a:ext uri="{FF2B5EF4-FFF2-40B4-BE49-F238E27FC236}">
+                <a16:creationId xmlns:a16="http://schemas.microsoft.com/office/drawing/2014/main" id="{F3B1E086-B9DB-4257-A705-90251F28E385}"/>
+              </a:ext>
+            </a:extLst>
+          </p:cNvPr>
+          <p:cNvCxnSpPr>
+            <a:cxnSpLocks/>
+            <a:stCxn id="28" idx="3"/>
+          </p:cNvCxnSpPr>
+          <p:nvPr/>
+        </p:nvCxnSpPr>
+        <p:spPr>
+          <a:xfrm flipV="1">
+            <a:off x="2857868" y="446509"/>
+            <a:ext cx="1098817" cy="19018"/>
+          </a:xfrm>
+          <a:prstGeom prst="line">
+            <a:avLst/>
+          </a:prstGeom>
+          <a:ln w="25400">
+            <a:solidFill>
+              <a:schemeClr val="accent4">
+                <a:lumMod val="75000"/>
+              </a:schemeClr>
+            </a:solidFill>
+          </a:ln>
+        </p:spPr>
+        <p:style>
+          <a:lnRef idx="1">
+            <a:schemeClr val="accent1"/>
+          </a:lnRef>
+          <a:fillRef idx="0">
+            <a:schemeClr val="accent1"/>
+          </a:fillRef>
+          <a:effectRef idx="0">
+            <a:schemeClr val="accent1"/>
+          </a:effectRef>
+          <a:fontRef idx="minor">
+            <a:schemeClr val="tx1"/>
+          </a:fontRef>
+        </p:style>
+      </p:cxnSp>
+      <p:pic>
+        <p:nvPicPr>
+          <p:cNvPr id="28" name="Picture 27">
+            <a:extLst>
+              <a:ext uri="{FF2B5EF4-FFF2-40B4-BE49-F238E27FC236}">
+                <a16:creationId xmlns:a16="http://schemas.microsoft.com/office/drawing/2014/main" id="{EFE17093-B5ED-4B9E-8927-2D9461978B5E}"/>
+              </a:ext>
+            </a:extLst>
+          </p:cNvPr>
+          <p:cNvPicPr>
+            <a:picLocks noChangeAspect="1"/>
+          </p:cNvPicPr>
+          <p:nvPr/>
+        </p:nvPicPr>
+        <p:blipFill>
+          <a:blip r:embed="rId6"/>
+          <a:stretch>
+            <a:fillRect/>
+          </a:stretch>
+        </p:blipFill>
+        <p:spPr>
+          <a:xfrm>
+            <a:off x="1215929" y="201913"/>
+            <a:ext cx="1641939" cy="527228"/>
+          </a:xfrm>
+          <a:prstGeom prst="rect">
+            <a:avLst/>
+          </a:prstGeom>
+        </p:spPr>
+      </p:pic>
+      <p:cxnSp>
+        <p:nvCxnSpPr>
+          <p:cNvPr id="36" name="Straight Connector 35">
+            <a:extLst>
+              <a:ext uri="{FF2B5EF4-FFF2-40B4-BE49-F238E27FC236}">
+                <a16:creationId xmlns:a16="http://schemas.microsoft.com/office/drawing/2014/main" id="{0A5066A6-7A74-4DC2-B3AC-28C8813BE09C}"/>
+              </a:ext>
+            </a:extLst>
+          </p:cNvPr>
+          <p:cNvCxnSpPr>
+            <a:cxnSpLocks/>
+            <a:endCxn id="28" idx="1"/>
+          </p:cNvCxnSpPr>
+          <p:nvPr/>
+        </p:nvCxnSpPr>
+        <p:spPr>
+          <a:xfrm flipH="1" flipV="1">
+            <a:off x="1215929" y="465527"/>
+            <a:ext cx="1796398" cy="1868098"/>
+          </a:xfrm>
+          <a:prstGeom prst="line">
+            <a:avLst/>
+          </a:prstGeom>
+          <a:ln w="25400">
+            <a:solidFill>
+              <a:schemeClr val="accent4">
+                <a:lumMod val="75000"/>
+              </a:schemeClr>
+            </a:solidFill>
+          </a:ln>
+        </p:spPr>
+        <p:style>
+          <a:lnRef idx="1">
+            <a:schemeClr val="accent1"/>
+          </a:lnRef>
+          <a:fillRef idx="0">
+            <a:schemeClr val="accent1"/>
+          </a:fillRef>
+          <a:effectRef idx="0">
+            <a:schemeClr val="accent1"/>
+          </a:effectRef>
+          <a:fontRef idx="minor">
+            <a:schemeClr val="tx1"/>
+          </a:fontRef>
+        </p:style>
+      </p:cxnSp>
+      <p:sp>
+        <p:nvSpPr>
+          <p:cNvPr id="40" name="TextBox 39">
+            <a:extLst>
+              <a:ext uri="{FF2B5EF4-FFF2-40B4-BE49-F238E27FC236}">
+                <a16:creationId xmlns:a16="http://schemas.microsoft.com/office/drawing/2014/main" id="{D0C6A65A-7034-4F8C-9A6F-DC2A9F91E72C}"/>
+              </a:ext>
+            </a:extLst>
+          </p:cNvPr>
+          <p:cNvSpPr txBox="1"/>
+          <p:nvPr/>
+        </p:nvSpPr>
+        <p:spPr>
+          <a:xfrm>
+            <a:off x="1779443" y="102888"/>
+            <a:ext cx="454398" cy="230832"/>
+          </a:xfrm>
+          <a:prstGeom prst="rect">
+            <a:avLst/>
+          </a:prstGeom>
+          <a:noFill/>
+        </p:spPr>
+        <p:txBody>
+          <a:bodyPr wrap="square" rtlCol="0">
+            <a:spAutoFit/>
+          </a:bodyPr>
+          <a:lstStyle/>
+          <a:p>
+            <a:r>
+              <a:rPr lang="en-US" sz="900" dirty="0"/>
+              <a:t>4.7k</a:t>
+            </a:r>
+            <a:endParaRPr lang="en-GB" sz="900" dirty="0"/>
           </a:p>
         </p:txBody>
       </p:sp>

</xml_diff>